<commit_message>
edited the screen sample powerpoint, ready for submission
</commit_message>
<xml_diff>
--- a/Screen Sample for Final Project.pptx
+++ b/Screen Sample for Final Project.pptx
@@ -7,6 +7,8 @@
   <p:sldIdLst>
     <p:sldId id="256" r:id="rId2"/>
     <p:sldId id="257" r:id="rId3"/>
+    <p:sldId id="259" r:id="rId4"/>
+    <p:sldId id="258" r:id="rId5"/>
   </p:sldIdLst>
   <p:sldSz cx="9144000" cy="6858000" type="screen4x3"/>
   <p:notesSz cx="6858000" cy="9144000"/>
@@ -105,6 +107,22 @@
       </a:defRPr>
     </a:lvl9pPr>
   </p:defaultTextStyle>
+  <p:extLst>
+    <p:ext uri="{EFAFB233-063F-42B5-8137-9DF3F51BA10A}">
+      <p15:sldGuideLst xmlns:p15="http://schemas.microsoft.com/office/powerpoint/2012/main">
+        <p15:guide id="1" orient="horz" pos="2160">
+          <p15:clr>
+            <a:srgbClr val="A4A3A4"/>
+          </p15:clr>
+        </p15:guide>
+        <p15:guide id="2" pos="2880">
+          <p15:clr>
+            <a:srgbClr val="A4A3A4"/>
+          </p15:clr>
+        </p15:guide>
+      </p15:sldGuideLst>
+    </p:ext>
+  </p:extLst>
 </p:presentation>
 </file>
 
@@ -289,7 +307,7 @@
           <a:p>
             <a:fld id="{502260FF-80E1-43BB-A898-B0F7FC093C20}" type="datetimeFigureOut">
               <a:rPr lang="en-US" smtClean="0"/>
-              <a:t>11/19/2015</a:t>
+              <a:t>11/20/2015</a:t>
             </a:fld>
             <a:endParaRPr lang="en-US"/>
           </a:p>
@@ -459,7 +477,7 @@
           <a:p>
             <a:fld id="{502260FF-80E1-43BB-A898-B0F7FC093C20}" type="datetimeFigureOut">
               <a:rPr lang="en-US" smtClean="0"/>
-              <a:t>11/19/2015</a:t>
+              <a:t>11/20/2015</a:t>
             </a:fld>
             <a:endParaRPr lang="en-US"/>
           </a:p>
@@ -639,7 +657,7 @@
           <a:p>
             <a:fld id="{502260FF-80E1-43BB-A898-B0F7FC093C20}" type="datetimeFigureOut">
               <a:rPr lang="en-US" smtClean="0"/>
-              <a:t>11/19/2015</a:t>
+              <a:t>11/20/2015</a:t>
             </a:fld>
             <a:endParaRPr lang="en-US"/>
           </a:p>
@@ -809,7 +827,7 @@
           <a:p>
             <a:fld id="{502260FF-80E1-43BB-A898-B0F7FC093C20}" type="datetimeFigureOut">
               <a:rPr lang="en-US" smtClean="0"/>
-              <a:t>11/19/2015</a:t>
+              <a:t>11/20/2015</a:t>
             </a:fld>
             <a:endParaRPr lang="en-US"/>
           </a:p>
@@ -1055,7 +1073,7 @@
           <a:p>
             <a:fld id="{502260FF-80E1-43BB-A898-B0F7FC093C20}" type="datetimeFigureOut">
               <a:rPr lang="en-US" smtClean="0"/>
-              <a:t>11/19/2015</a:t>
+              <a:t>11/20/2015</a:t>
             </a:fld>
             <a:endParaRPr lang="en-US"/>
           </a:p>
@@ -1343,7 +1361,7 @@
           <a:p>
             <a:fld id="{502260FF-80E1-43BB-A898-B0F7FC093C20}" type="datetimeFigureOut">
               <a:rPr lang="en-US" smtClean="0"/>
-              <a:t>11/19/2015</a:t>
+              <a:t>11/20/2015</a:t>
             </a:fld>
             <a:endParaRPr lang="en-US"/>
           </a:p>
@@ -1765,7 +1783,7 @@
           <a:p>
             <a:fld id="{502260FF-80E1-43BB-A898-B0F7FC093C20}" type="datetimeFigureOut">
               <a:rPr lang="en-US" smtClean="0"/>
-              <a:t>11/19/2015</a:t>
+              <a:t>11/20/2015</a:t>
             </a:fld>
             <a:endParaRPr lang="en-US"/>
           </a:p>
@@ -1883,7 +1901,7 @@
           <a:p>
             <a:fld id="{502260FF-80E1-43BB-A898-B0F7FC093C20}" type="datetimeFigureOut">
               <a:rPr lang="en-US" smtClean="0"/>
-              <a:t>11/19/2015</a:t>
+              <a:t>11/20/2015</a:t>
             </a:fld>
             <a:endParaRPr lang="en-US"/>
           </a:p>
@@ -1978,7 +1996,7 @@
           <a:p>
             <a:fld id="{502260FF-80E1-43BB-A898-B0F7FC093C20}" type="datetimeFigureOut">
               <a:rPr lang="en-US" smtClean="0"/>
-              <a:t>11/19/2015</a:t>
+              <a:t>11/20/2015</a:t>
             </a:fld>
             <a:endParaRPr lang="en-US"/>
           </a:p>
@@ -2255,7 +2273,7 @@
           <a:p>
             <a:fld id="{502260FF-80E1-43BB-A898-B0F7FC093C20}" type="datetimeFigureOut">
               <a:rPr lang="en-US" smtClean="0"/>
-              <a:t>11/19/2015</a:t>
+              <a:t>11/20/2015</a:t>
             </a:fld>
             <a:endParaRPr lang="en-US"/>
           </a:p>
@@ -2508,7 +2526,7 @@
           <a:p>
             <a:fld id="{502260FF-80E1-43BB-A898-B0F7FC093C20}" type="datetimeFigureOut">
               <a:rPr lang="en-US" smtClean="0"/>
-              <a:t>11/19/2015</a:t>
+              <a:t>11/20/2015</a:t>
             </a:fld>
             <a:endParaRPr lang="en-US"/>
           </a:p>
@@ -2721,7 +2739,7 @@
           <a:p>
             <a:fld id="{502260FF-80E1-43BB-A898-B0F7FC093C20}" type="datetimeFigureOut">
               <a:rPr lang="en-US" smtClean="0"/>
-              <a:t>11/19/2015</a:t>
+              <a:t>11/20/2015</a:t>
             </a:fld>
             <a:endParaRPr lang="en-US"/>
           </a:p>
@@ -3274,6 +3292,179 @@
     <p:extLst>
       <p:ext uri="{BB962C8B-B14F-4D97-AF65-F5344CB8AC3E}">
         <p14:creationId xmlns:p14="http://schemas.microsoft.com/office/powerpoint/2010/main" val="3395774900"/>
+      </p:ext>
+    </p:extLst>
+  </p:cSld>
+  <p:clrMapOvr>
+    <a:masterClrMapping/>
+  </p:clrMapOvr>
+</p:sld>
+</file>
+
+<file path=ppt/slides/slide3.xml><?xml version="1.0" encoding="utf-8"?>
+<p:sld xmlns:a="http://schemas.openxmlformats.org/drawingml/2006/main" xmlns:r="http://schemas.openxmlformats.org/officeDocument/2006/relationships" xmlns:p="http://schemas.openxmlformats.org/presentationml/2006/main">
+  <p:cSld>
+    <p:spTree>
+      <p:nvGrpSpPr>
+        <p:cNvPr id="1" name=""/>
+        <p:cNvGrpSpPr/>
+        <p:nvPr/>
+      </p:nvGrpSpPr>
+      <p:grpSpPr>
+        <a:xfrm>
+          <a:off x="0" y="0"/>
+          <a:ext cx="0" cy="0"/>
+          <a:chOff x="0" y="0"/>
+          <a:chExt cx="0" cy="0"/>
+        </a:xfrm>
+      </p:grpSpPr>
+      <p:sp>
+        <p:nvSpPr>
+          <p:cNvPr id="2" name="Title 1"/>
+          <p:cNvSpPr>
+            <a:spLocks noGrp="1"/>
+          </p:cNvSpPr>
+          <p:nvPr>
+            <p:ph type="title"/>
+          </p:nvPr>
+        </p:nvSpPr>
+        <p:spPr/>
+        <p:txBody>
+          <a:bodyPr/>
+          <a:lstStyle/>
+          <a:p>
+            <a:r>
+              <a:rPr lang="en-US" dirty="0" smtClean="0"/>
+              <a:t>Description</a:t>
+            </a:r>
+            <a:endParaRPr lang="en-US" dirty="0"/>
+          </a:p>
+        </p:txBody>
+      </p:sp>
+      <p:sp>
+        <p:nvSpPr>
+          <p:cNvPr id="3" name="Content Placeholder 2"/>
+          <p:cNvSpPr>
+            <a:spLocks noGrp="1"/>
+          </p:cNvSpPr>
+          <p:nvPr>
+            <p:ph idx="1"/>
+          </p:nvPr>
+        </p:nvSpPr>
+        <p:spPr/>
+        <p:txBody>
+          <a:bodyPr>
+            <a:normAutofit lnSpcReduction="10000"/>
+          </a:bodyPr>
+          <a:lstStyle/>
+          <a:p>
+            <a:r>
+              <a:rPr lang="en-US" dirty="0" smtClean="0"/>
+              <a:t>Right side would be a display board of player info and helping info.</a:t>
+            </a:r>
+          </a:p>
+          <a:p>
+            <a:r>
+              <a:rPr lang="en-US" dirty="0" smtClean="0"/>
+              <a:t>Bottom side would be used for the game itself displaying questions and timer for player.</a:t>
+            </a:r>
+          </a:p>
+          <a:p>
+            <a:r>
+              <a:rPr lang="en-US" dirty="0" smtClean="0"/>
+              <a:t>Rest of the display would be the maze with walls and collectables including answers and items. Player would be spawned near the center of maze to start with given certain amount of time to answer </a:t>
+            </a:r>
+            <a:r>
+              <a:rPr lang="en-US" smtClean="0"/>
+              <a:t>question given.</a:t>
+            </a:r>
+            <a:endParaRPr lang="en-US" dirty="0"/>
+          </a:p>
+        </p:txBody>
+      </p:sp>
+    </p:spTree>
+    <p:extLst>
+      <p:ext uri="{BB962C8B-B14F-4D97-AF65-F5344CB8AC3E}">
+        <p14:creationId xmlns:p14="http://schemas.microsoft.com/office/powerpoint/2010/main" val="1760950636"/>
+      </p:ext>
+    </p:extLst>
+  </p:cSld>
+  <p:clrMapOvr>
+    <a:masterClrMapping/>
+  </p:clrMapOvr>
+</p:sld>
+</file>
+
+<file path=ppt/slides/slide4.xml><?xml version="1.0" encoding="utf-8"?>
+<p:sld xmlns:a="http://schemas.openxmlformats.org/drawingml/2006/main" xmlns:r="http://schemas.openxmlformats.org/officeDocument/2006/relationships" xmlns:p="http://schemas.openxmlformats.org/presentationml/2006/main">
+  <p:cSld>
+    <p:spTree>
+      <p:nvGrpSpPr>
+        <p:cNvPr id="1" name=""/>
+        <p:cNvGrpSpPr/>
+        <p:nvPr/>
+      </p:nvGrpSpPr>
+      <p:grpSpPr>
+        <a:xfrm>
+          <a:off x="0" y="0"/>
+          <a:ext cx="0" cy="0"/>
+          <a:chOff x="0" y="0"/>
+          <a:chExt cx="0" cy="0"/>
+        </a:xfrm>
+      </p:grpSpPr>
+      <p:sp>
+        <p:nvSpPr>
+          <p:cNvPr id="2" name="Title 1"/>
+          <p:cNvSpPr>
+            <a:spLocks noGrp="1"/>
+          </p:cNvSpPr>
+          <p:nvPr>
+            <p:ph type="title"/>
+          </p:nvPr>
+        </p:nvSpPr>
+        <p:spPr/>
+        <p:txBody>
+          <a:bodyPr/>
+          <a:lstStyle/>
+          <a:p>
+            <a:r>
+              <a:rPr lang="en-US" dirty="0" smtClean="0"/>
+              <a:t>Other Floor Design</a:t>
+            </a:r>
+            <a:endParaRPr lang="en-US" dirty="0"/>
+          </a:p>
+        </p:txBody>
+      </p:sp>
+      <p:pic>
+        <p:nvPicPr>
+          <p:cNvPr id="4" name="Content Placeholder 3"/>
+          <p:cNvPicPr>
+            <a:picLocks noGrp="1" noChangeAspect="1"/>
+          </p:cNvPicPr>
+          <p:nvPr>
+            <p:ph idx="1"/>
+          </p:nvPr>
+        </p:nvPicPr>
+        <p:blipFill>
+          <a:blip r:embed="rId2"/>
+          <a:stretch>
+            <a:fillRect/>
+          </a:stretch>
+        </p:blipFill>
+        <p:spPr>
+          <a:xfrm>
+            <a:off x="1389787" y="1600200"/>
+            <a:ext cx="6364426" cy="4525963"/>
+          </a:xfrm>
+          <a:prstGeom prst="rect">
+            <a:avLst/>
+          </a:prstGeom>
+        </p:spPr>
+      </p:pic>
+    </p:spTree>
+    <p:extLst>
+      <p:ext uri="{BB962C8B-B14F-4D97-AF65-F5344CB8AC3E}">
+        <p14:creationId xmlns:p14="http://schemas.microsoft.com/office/powerpoint/2010/main" val="2223605012"/>
       </p:ext>
     </p:extLst>
   </p:cSld>

</xml_diff>